<commit_message>
Final Project Slides Revision
</commit_message>
<xml_diff>
--- a/Final Project/project_merranko_rodgers.pptx
+++ b/Final Project/project_merranko_rodgers.pptx
@@ -3997,11 +3997,7 @@
             </a:r>
             <a:r>
               <a:rPr lang="en-US" dirty="0" smtClean="0"/>
-              <a:t>outcome and </a:t>
-            </a:r>
-            <a:r>
-              <a:rPr lang="en-US" dirty="0" smtClean="0"/>
-              <a:t>predictor </a:t>
+              <a:t>outcome and predictor </a:t>
             </a:r>
             <a:r>
               <a:rPr lang="en-US" dirty="0"/>
@@ -4108,6 +4104,13 @@
   <p:clrMapOvr>
     <a:masterClrMapping/>
   </p:clrMapOvr>
+  <p:timing>
+    <p:tnLst>
+      <p:par>
+        <p:cTn id="1" dur="indefinite" restart="never" nodeType="tmRoot"/>
+      </p:par>
+    </p:tnLst>
+  </p:timing>
 </p:sld>
 </file>
 
@@ -6503,7 +6506,7 @@
           <a:p>
             <a:r>
               <a:rPr lang="en-US" dirty="0" smtClean="0"/>
-              <a:t>Use data </a:t>
+              <a:t>Used data </a:t>
             </a:r>
             <a:r>
               <a:rPr lang="en-US" dirty="0"/>
@@ -6680,21 +6683,22 @@
           <a:p>
             <a:r>
               <a:rPr lang="en-US" dirty="0"/>
-              <a:t>We also remove some punctuation within each line of text to get only a series of </a:t>
+              <a:t>We also </a:t>
             </a:r>
             <a:r>
               <a:rPr lang="en-US" dirty="0" smtClean="0"/>
-              <a:t>words</a:t>
-            </a:r>
-          </a:p>
-          <a:p>
+              <a:t>removed most </a:t>
+            </a:r>
             <a:r>
               <a:rPr lang="en-US" dirty="0"/>
-              <a:t>I</a:t>
-            </a:r>
+              <a:t>punctuation within each line of text </a:t>
+            </a:r>
+            <a:endParaRPr lang="en-US" dirty="0" smtClean="0"/>
+          </a:p>
+          <a:p>
             <a:r>
               <a:rPr lang="en-US" dirty="0" smtClean="0"/>
-              <a:t>ssues </a:t>
+              <a:t>Issues </a:t>
             </a:r>
             <a:r>
               <a:rPr lang="en-US" dirty="0"/>
@@ -6702,15 +6706,7 @@
             </a:r>
             <a:r>
               <a:rPr lang="en-US" dirty="0" smtClean="0"/>
-              <a:t>combinations from removal of </a:t>
-            </a:r>
-            <a:r>
-              <a:rPr lang="en-US" dirty="0" err="1" smtClean="0"/>
-              <a:t>puncuation</a:t>
-            </a:r>
-            <a:r>
-              <a:rPr lang="en-US" dirty="0" smtClean="0"/>
-              <a:t> </a:t>
+              <a:t>combinations from removal of punctuation </a:t>
             </a:r>
             <a:r>
               <a:rPr lang="en-US" dirty="0"/>
@@ -6768,6 +6764,13 @@
   <p:clrMapOvr>
     <a:masterClrMapping/>
   </p:clrMapOvr>
+  <p:timing>
+    <p:tnLst>
+      <p:par>
+        <p:cTn id="1" dur="indefinite" restart="never" nodeType="tmRoot"/>
+      </p:par>
+    </p:tnLst>
+  </p:timing>
 </p:sld>
 </file>
 
@@ -6891,11 +6894,11 @@
             </a:r>
             <a:r>
               <a:rPr lang="en-US" dirty="0" smtClean="0"/>
-              <a:t>relevant info each </a:t>
+              <a:t>relevant info to </a:t>
             </a:r>
             <a:r>
               <a:rPr lang="en-US" dirty="0"/>
-              <a:t>to the </a:t>
+              <a:t>the </a:t>
             </a:r>
             <a:r>
               <a:rPr lang="en-US" dirty="0" err="1"/>
@@ -6917,7 +6920,15 @@
             </a:r>
             <a:r>
               <a:rPr lang="en-US" dirty="0"/>
-              <a:t>a visual representation of the home depot data</a:t>
+              <a:t>a visual representation of the </a:t>
+            </a:r>
+            <a:r>
+              <a:rPr lang="en-US" dirty="0" smtClean="0"/>
+              <a:t>now cleaned home </a:t>
+            </a:r>
+            <a:r>
+              <a:rPr lang="en-US" dirty="0"/>
+              <a:t>depot data</a:t>
             </a:r>
           </a:p>
         </p:txBody>
@@ -6932,6 +6943,13 @@
   <p:clrMapOvr>
     <a:masterClrMapping/>
   </p:clrMapOvr>
+  <p:timing>
+    <p:tnLst>
+      <p:par>
+        <p:cTn id="1" dur="indefinite" restart="never" nodeType="tmRoot"/>
+      </p:par>
+    </p:tnLst>
+  </p:timing>
 </p:sld>
 </file>
 
@@ -7029,7 +7047,15 @@
             </a:r>
             <a:r>
               <a:rPr lang="en-US" dirty="0"/>
-              <a:t>products having a word count of 250 or less with 154.2 as the mean</a:t>
+              <a:t>products </a:t>
+            </a:r>
+            <a:r>
+              <a:rPr lang="en-US" dirty="0" smtClean="0"/>
+              <a:t>have </a:t>
+            </a:r>
+            <a:r>
+              <a:rPr lang="en-US" dirty="0"/>
+              <a:t>a word count of 250 or less with 154.2 as the mean</a:t>
             </a:r>
           </a:p>
         </p:txBody>
@@ -7066,6 +7092,13 @@
   <p:clrMapOvr>
     <a:masterClrMapping/>
   </p:clrMapOvr>
+  <p:timing>
+    <p:tnLst>
+      <p:par>
+        <p:cTn id="1" dur="indefinite" restart="never" nodeType="tmRoot"/>
+      </p:par>
+    </p:tnLst>
+  </p:timing>
 </p:sld>
 </file>
 
@@ -7144,12 +7177,25 @@
             </a:r>
             <a:r>
               <a:rPr lang="en-US" dirty="0"/>
-              <a:t>the frequency of the number of words per cleaned train and test search </a:t>
+              <a:t>the frequency </a:t>
             </a:r>
             <a:r>
               <a:rPr lang="en-US" dirty="0" smtClean="0"/>
-              <a:t>terms</a:t>
-            </a:r>
+              <a:t>of cleaned </a:t>
+            </a:r>
+            <a:r>
+              <a:rPr lang="en-US" dirty="0"/>
+              <a:t>train and test search </a:t>
+            </a:r>
+            <a:r>
+              <a:rPr lang="en-US" dirty="0" smtClean="0"/>
+              <a:t>terms based on the number </a:t>
+            </a:r>
+            <a:r>
+              <a:rPr lang="en-US" dirty="0"/>
+              <a:t>of words </a:t>
+            </a:r>
+            <a:endParaRPr lang="en-US" dirty="0" smtClean="0"/>
           </a:p>
           <a:p>
             <a:r>
@@ -7168,7 +7214,15 @@
           <a:p>
             <a:r>
               <a:rPr lang="en-US" dirty="0"/>
-              <a:t>The mean for the train data is 3.317 and the mean for the test data is 3.12</a:t>
+              <a:t>The mean </a:t>
+            </a:r>
+            <a:r>
+              <a:rPr lang="en-US" dirty="0" smtClean="0"/>
+              <a:t>for </a:t>
+            </a:r>
+            <a:r>
+              <a:rPr lang="en-US" dirty="0"/>
+              <a:t>the train data is 3.317 and the mean for the test data is 3.12</a:t>
             </a:r>
           </a:p>
         </p:txBody>
@@ -7227,6 +7281,13 @@
   <p:clrMapOvr>
     <a:masterClrMapping/>
   </p:clrMapOvr>
+  <p:timing>
+    <p:tnLst>
+      <p:par>
+        <p:cTn id="1" dur="indefinite" restart="never" nodeType="tmRoot"/>
+      </p:par>
+    </p:tnLst>
+  </p:timing>
 </p:sld>
 </file>
 
@@ -7325,7 +7386,15 @@
             </a:r>
             <a:r>
               <a:rPr lang="en-US" dirty="0"/>
-              <a:t>calculate the proportion of words or numbers in the product brand name, title, and combined description and attributes (where applicable) that matched text in the search </a:t>
+              <a:t>calculate the proportion of words or numbers in the product brand name, title, and combined description and attributes </a:t>
+            </a:r>
+            <a:r>
+              <a:rPr lang="en-US" dirty="0" smtClean="0"/>
+              <a:t>that </a:t>
+            </a:r>
+            <a:r>
+              <a:rPr lang="en-US" dirty="0"/>
+              <a:t>matched text in the search </a:t>
             </a:r>
             <a:r>
               <a:rPr lang="en-US" dirty="0" smtClean="0"/>
@@ -7334,12 +7403,8 @@
           </a:p>
           <a:p>
             <a:r>
-              <a:rPr lang="en-US" dirty="0"/>
-              <a:t>U</a:t>
-            </a:r>
-            <a:r>
               <a:rPr lang="en-US" dirty="0" smtClean="0"/>
-              <a:t>se </a:t>
+              <a:t>We use </a:t>
             </a:r>
             <a:r>
               <a:rPr lang="en-US" dirty="0"/>
@@ -7381,6 +7446,13 @@
   <p:clrMapOvr>
     <a:masterClrMapping/>
   </p:clrMapOvr>
+  <p:timing>
+    <p:tnLst>
+      <p:par>
+        <p:cTn id="1" dur="indefinite" restart="never" nodeType="tmRoot"/>
+      </p:par>
+    </p:tnLst>
+  </p:timing>
 </p:sld>
 </file>
 
@@ -7776,7 +7848,31 @@
                 </a14:m>
                 <a:r>
                   <a:rPr lang="en-US" dirty="0"/>
-                  <a:t>: represents machine learning regression technique (e.g., random forest, support </a:t>
+                  <a:t>: represents </a:t>
+                </a:r>
+                <a:r>
+                  <a:rPr lang="en-US" dirty="0" smtClean="0"/>
+                  <a:t>a machine </a:t>
+                </a:r>
+                <a:r>
+                  <a:rPr lang="en-US" dirty="0"/>
+                  <a:t>learning regression technique </a:t>
+                </a:r>
+                <a:r>
+                  <a:rPr lang="en-US" dirty="0" smtClean="0"/>
+                  <a:t>(</a:t>
+                </a:r>
+                <a:r>
+                  <a:rPr lang="en-US" dirty="0" err="1" smtClean="0"/>
+                  <a:t>ie</a:t>
+                </a:r>
+                <a:r>
+                  <a:rPr lang="en-US" dirty="0" smtClean="0"/>
+                  <a:t>, random </a:t>
+                </a:r>
+                <a:r>
+                  <a:rPr lang="en-US" dirty="0"/>
+                  <a:t>forest, support </a:t>
                 </a:r>
                 <a:r>
                   <a:rPr lang="en-US" dirty="0" smtClean="0"/>
@@ -7784,7 +7880,15 @@
                 </a:r>
                 <a:r>
                   <a:rPr lang="en-US" dirty="0"/>
-                  <a:t>regression, etc.) found to have lowest RMSE when predicting </a:t>
+                  <a:t>regression, etc.) found to have lowest </a:t>
+                </a:r>
+                <a:r>
+                  <a:rPr lang="en-US" dirty="0" smtClean="0"/>
+                  <a:t>the RMSE </a:t>
+                </a:r>
+                <a:r>
+                  <a:rPr lang="en-US" dirty="0"/>
+                  <a:t>when predicting </a:t>
                 </a:r>
                 <a14:m>
                   <m:oMath xmlns:m="http://schemas.openxmlformats.org/officeDocument/2006/math">
@@ -8081,10 +8185,10 @@
                 <a:off x="457200" y="1295400"/>
                 <a:ext cx="7620000" cy="5105400"/>
               </a:xfrm>
-              <a:blipFill rotWithShape="0">
+              <a:blipFill rotWithShape="1">
                 <a:blip r:embed="rId2"/>
                 <a:stretch>
-                  <a:fillRect t="-597" r="-640" b="-717"/>
+                  <a:fillRect t="-597" r="-640" b="-597"/>
                 </a:stretch>
               </a:blipFill>
             </p:spPr>
@@ -8167,6 +8271,13 @@
   <p:clrMapOvr>
     <a:masterClrMapping/>
   </p:clrMapOvr>
+  <p:timing>
+    <p:tnLst>
+      <p:par>
+        <p:cTn id="1" dur="indefinite" restart="never" nodeType="tmRoot"/>
+      </p:par>
+    </p:tnLst>
+  </p:timing>
 </p:sld>
 </file>
 
@@ -8280,13 +8391,13 @@
                     <m:oMath xmlns:m="http://schemas.openxmlformats.org/officeDocument/2006/math">
                       <m:r>
                         <a:rPr lang="en-US" i="1">
-                          <a:latin typeface="Cambria Math" panose="02040503050406030204" pitchFamily="18" charset="0"/>
+                          <a:latin typeface="Cambria Math"/>
                         </a:rPr>
                         <m:t>𝑅𝑀𝑆𝐸</m:t>
                       </m:r>
                       <m:r>
                         <a:rPr lang="en-US" i="1">
-                          <a:latin typeface="Cambria Math" panose="02040503050406030204" pitchFamily="18" charset="0"/>
+                          <a:latin typeface="Cambria Math"/>
                         </a:rPr>
                         <m:t>=</m:t>
                       </m:r>
@@ -8323,13 +8434,13 @@
                                 <m:sub>
                                   <m:r>
                                     <a:rPr lang="en-US" i="1">
-                                      <a:latin typeface="Cambria Math" panose="02040503050406030204" pitchFamily="18" charset="0"/>
+                                      <a:latin typeface="Cambria Math"/>
                                     </a:rPr>
                                     <m:t>𝑖</m:t>
                                   </m:r>
                                   <m:r>
                                     <a:rPr lang="en-US" i="1">
-                                      <a:latin typeface="Cambria Math" panose="02040503050406030204" pitchFamily="18" charset="0"/>
+                                      <a:latin typeface="Cambria Math"/>
                                     </a:rPr>
                                     <m:t>=1</m:t>
                                   </m:r>
@@ -8337,7 +8448,7 @@
                                 <m:sup>
                                   <m:r>
                                     <a:rPr lang="en-US" i="1">
-                                      <a:latin typeface="Cambria Math" panose="02040503050406030204" pitchFamily="18" charset="0"/>
+                                      <a:latin typeface="Cambria Math"/>
                                     </a:rPr>
                                     <m:t>𝑛</m:t>
                                   </m:r>
@@ -8354,7 +8465,7 @@
                                     <m:e>
                                       <m:r>
                                         <a:rPr lang="en-US" i="1">
-                                          <a:latin typeface="Cambria Math" panose="02040503050406030204" pitchFamily="18" charset="0"/>
+                                          <a:latin typeface="Cambria Math"/>
                                         </a:rPr>
                                         <m:t>(</m:t>
                                       </m:r>
@@ -8369,7 +8480,7 @@
                                         <m:e>
                                           <m:r>
                                             <a:rPr lang="en-US" i="1">
-                                              <a:latin typeface="Cambria Math" panose="02040503050406030204" pitchFamily="18" charset="0"/>
+                                              <a:latin typeface="Cambria Math"/>
                                             </a:rPr>
                                             <m:t>𝑌</m:t>
                                           </m:r>
@@ -8377,19 +8488,19 @@
                                         <m:sub>
                                           <m:r>
                                             <a:rPr lang="en-US" i="1">
-                                              <a:latin typeface="Cambria Math" panose="02040503050406030204" pitchFamily="18" charset="0"/>
+                                              <a:latin typeface="Cambria Math"/>
                                             </a:rPr>
                                             <m:t>𝑜𝑏𝑠𝑒𝑟𝑣𝑒𝑑</m:t>
                                           </m:r>
                                           <m:r>
                                             <a:rPr lang="en-US" i="1">
-                                              <a:latin typeface="Cambria Math" panose="02040503050406030204" pitchFamily="18" charset="0"/>
+                                              <a:latin typeface="Cambria Math"/>
                                             </a:rPr>
                                             <m:t>, </m:t>
                                           </m:r>
                                           <m:r>
                                             <a:rPr lang="en-US" i="1">
-                                              <a:latin typeface="Cambria Math" panose="02040503050406030204" pitchFamily="18" charset="0"/>
+                                              <a:latin typeface="Cambria Math"/>
                                             </a:rPr>
                                             <m:t>𝑖</m:t>
                                           </m:r>
@@ -8397,7 +8508,7 @@
                                       </m:sSub>
                                       <m:r>
                                         <a:rPr lang="en-US" i="1">
-                                          <a:latin typeface="Cambria Math" panose="02040503050406030204" pitchFamily="18" charset="0"/>
+                                          <a:latin typeface="Cambria Math"/>
                                         </a:rPr>
                                         <m:t>−</m:t>
                                       </m:r>
@@ -8412,7 +8523,7 @@
                                         <m:e>
                                           <m:r>
                                             <a:rPr lang="en-US" i="1">
-                                              <a:latin typeface="Cambria Math" panose="02040503050406030204" pitchFamily="18" charset="0"/>
+                                              <a:latin typeface="Cambria Math"/>
                                             </a:rPr>
                                             <m:t>𝑌</m:t>
                                           </m:r>
@@ -8420,19 +8531,19 @@
                                         <m:sub>
                                           <m:r>
                                             <a:rPr lang="en-US" i="1">
-                                              <a:latin typeface="Cambria Math" panose="02040503050406030204" pitchFamily="18" charset="0"/>
+                                              <a:latin typeface="Cambria Math"/>
                                             </a:rPr>
                                             <m:t>𝑝𝑟𝑒𝑑𝑖𝑐𝑡𝑒𝑑</m:t>
                                           </m:r>
                                           <m:r>
                                             <a:rPr lang="en-US" i="1">
-                                              <a:latin typeface="Cambria Math" panose="02040503050406030204" pitchFamily="18" charset="0"/>
+                                              <a:latin typeface="Cambria Math"/>
                                             </a:rPr>
                                             <m:t>, </m:t>
                                           </m:r>
                                           <m:r>
                                             <a:rPr lang="en-US" i="1">
-                                              <a:latin typeface="Cambria Math" panose="02040503050406030204" pitchFamily="18" charset="0"/>
+                                              <a:latin typeface="Cambria Math"/>
                                             </a:rPr>
                                             <m:t>𝑖</m:t>
                                           </m:r>
@@ -8440,7 +8551,7 @@
                                       </m:sSub>
                                       <m:r>
                                         <a:rPr lang="en-US" i="1">
-                                          <a:latin typeface="Cambria Math" panose="02040503050406030204" pitchFamily="18" charset="0"/>
+                                          <a:latin typeface="Cambria Math"/>
                                         </a:rPr>
                                         <m:t>)</m:t>
                                       </m:r>
@@ -8448,7 +8559,7 @@
                                     <m:sup>
                                       <m:r>
                                         <a:rPr lang="en-US" i="1">
-                                          <a:latin typeface="Cambria Math" panose="02040503050406030204" pitchFamily="18" charset="0"/>
+                                          <a:latin typeface="Cambria Math"/>
                                         </a:rPr>
                                         <m:t>2</m:t>
                                       </m:r>
@@ -8460,7 +8571,7 @@
                             <m:den>
                               <m:r>
                                 <a:rPr lang="en-US" i="1">
-                                  <a:latin typeface="Cambria Math" panose="02040503050406030204" pitchFamily="18" charset="0"/>
+                                  <a:latin typeface="Cambria Math"/>
                                 </a:rPr>
                                 <m:t>𝑛</m:t>
                               </m:r>
@@ -8530,6 +8641,13 @@
   <p:clrMapOvr>
     <a:masterClrMapping/>
   </p:clrMapOvr>
+  <p:timing>
+    <p:tnLst>
+      <p:par>
+        <p:cTn id="1" dur="indefinite" restart="never" nodeType="tmRoot"/>
+      </p:par>
+    </p:tnLst>
+  </p:timing>
 </p:sld>
 </file>
 

</xml_diff>